<commit_message>
Further update on the ppt
</commit_message>
<xml_diff>
--- a/Documentation/Research Paper/AES ppt presentation.pptx
+++ b/Documentation/Research Paper/AES ppt presentation.pptx
@@ -8070,13 +8070,8 @@
             <a:pPr algn="just"/>
             <a:r>
               <a:rPr lang="en-PH" dirty="0"/>
-              <a:t>To authenticate all participating devices in </a:t>
-            </a:r>
-            <a:r>
-              <a:rPr lang="en-PH"/>
-              <a:t>data exchange</a:t>
-            </a:r>
-            <a:endParaRPr lang="en-PH" dirty="0"/>
+              <a:t>To authenticate all participating devices in data exchange</a:t>
+            </a:r>
           </a:p>
         </p:txBody>
       </p:sp>

</xml_diff>